<commit_message>
update how to raise my tech
</commit_message>
<xml_diff>
--- a/ytabuchi_devsumi.pptx
+++ b/ytabuchi_devsumi.pptx
@@ -14,8 +14,9 @@
     <p:sldId id="264" r:id="rId8"/>
     <p:sldId id="265" r:id="rId9"/>
     <p:sldId id="263" r:id="rId10"/>
-    <p:sldId id="266" r:id="rId11"/>
-    <p:sldId id="262" r:id="rId12"/>
+    <p:sldId id="267" r:id="rId11"/>
+    <p:sldId id="266" r:id="rId12"/>
+    <p:sldId id="262" r:id="rId13"/>
   </p:sldIdLst>
   <p:sldSz cx="12192000" cy="6858000"/>
   <p:notesSz cx="6858000" cy="9144000"/>
@@ -3288,11 +3289,7 @@
             </a:r>
             <a:r>
               <a:rPr lang="ja-JP" altLang="en-US" dirty="0" smtClean="0"/>
-              <a:t>営業に向けた技術</a:t>
-            </a:r>
-            <a:r>
-              <a:rPr lang="ja-JP" altLang="en-US" dirty="0" smtClean="0"/>
-              <a:t>コミュニティ参加のススメ</a:t>
+              <a:t>営業に向けた技術コミュニティ参加のススメ</a:t>
             </a:r>
             <a:endParaRPr kumimoji="1" lang="ja-JP" altLang="en-US" dirty="0"/>
           </a:p>
@@ -3315,7 +3312,23 @@
           <a:p>
             <a:r>
               <a:rPr lang="ja-JP" altLang="en-US" dirty="0" smtClean="0"/>
-              <a:t>是非この話を持ち帰って、御社内の気概のある営業を見つけてください！！</a:t>
+              <a:t>是非この話を</a:t>
+            </a:r>
+            <a:r>
+              <a:rPr lang="ja-JP" altLang="en-US" dirty="0" smtClean="0"/>
+              <a:t>持ち帰って気概</a:t>
+            </a:r>
+            <a:r>
+              <a:rPr lang="ja-JP" altLang="en-US" dirty="0" smtClean="0"/>
+              <a:t>のある営業を</a:t>
+            </a:r>
+            <a:r>
+              <a:rPr lang="ja-JP" altLang="en-US" dirty="0" smtClean="0"/>
+              <a:t>見つけ、育ててください</a:t>
+            </a:r>
+            <a:r>
+              <a:rPr lang="ja-JP" altLang="en-US" dirty="0" smtClean="0"/>
+              <a:t>！！</a:t>
             </a:r>
             <a:endParaRPr kumimoji="1" lang="ja-JP" altLang="en-US" dirty="0"/>
           </a:p>
@@ -3367,6 +3380,155 @@
           <a:lstStyle/>
           <a:p>
             <a:r>
+              <a:rPr kumimoji="1" lang="ja-JP" altLang="en-US" dirty="0" smtClean="0"/>
+              <a:t>技術を伸ばすには</a:t>
+            </a:r>
+            <a:endParaRPr kumimoji="1" lang="ja-JP" altLang="en-US" dirty="0"/>
+          </a:p>
+        </p:txBody>
+      </p:sp>
+      <p:sp>
+        <p:nvSpPr>
+          <p:cNvPr id="3" name="コンテンツ プレースホルダー 2"/>
+          <p:cNvSpPr>
+            <a:spLocks noGrp="1"/>
+          </p:cNvSpPr>
+          <p:nvPr>
+            <p:ph idx="1"/>
+          </p:nvPr>
+        </p:nvSpPr>
+        <p:spPr/>
+        <p:txBody>
+          <a:bodyPr/>
+          <a:lstStyle/>
+          <a:p>
+            <a:r>
+              <a:rPr kumimoji="1" lang="ja-JP" altLang="en-US" dirty="0" smtClean="0"/>
+              <a:t>インプット</a:t>
+            </a:r>
+            <a:endParaRPr kumimoji="1" lang="en-US" altLang="ja-JP" dirty="0" smtClean="0"/>
+          </a:p>
+          <a:p>
+            <a:r>
+              <a:rPr lang="ja-JP" altLang="en-US" dirty="0" smtClean="0"/>
+              <a:t>体系的に学んだほうが良い</a:t>
+            </a:r>
+            <a:endParaRPr kumimoji="1" lang="en-US" altLang="ja-JP" dirty="0" smtClean="0"/>
+          </a:p>
+          <a:p>
+            <a:r>
+              <a:rPr lang="ja-JP" altLang="en-US" dirty="0" smtClean="0"/>
+              <a:t>アウトプット</a:t>
+            </a:r>
+            <a:endParaRPr lang="en-US" altLang="ja-JP" dirty="0" smtClean="0"/>
+          </a:p>
+          <a:p>
+            <a:r>
+              <a:rPr lang="ja-JP" altLang="en-US" dirty="0" smtClean="0"/>
+              <a:t>ブログ、</a:t>
+            </a:r>
+            <a:r>
+              <a:rPr lang="en-US" altLang="ja-JP" dirty="0" err="1" smtClean="0"/>
+              <a:t>Qiita</a:t>
+            </a:r>
+            <a:r>
+              <a:rPr lang="ja-JP" altLang="en-US" dirty="0" smtClean="0"/>
+              <a:t>、</a:t>
+            </a:r>
+            <a:r>
+              <a:rPr lang="en-US" altLang="ja-JP" dirty="0" smtClean="0"/>
+              <a:t>SNS</a:t>
+            </a:r>
+            <a:r>
+              <a:rPr lang="ja-JP" altLang="en-US" dirty="0" smtClean="0"/>
+              <a:t>、アウトプット出来る場所はかなりある</a:t>
+            </a:r>
+            <a:endParaRPr lang="en-US" altLang="ja-JP" dirty="0" smtClean="0"/>
+          </a:p>
+          <a:p>
+            <a:r>
+              <a:rPr lang="ja-JP" altLang="en-US" dirty="0" smtClean="0"/>
+              <a:t>アウトプットしない人に反応は返ってこない</a:t>
+            </a:r>
+            <a:endParaRPr lang="en-US" altLang="ja-JP" dirty="0" smtClean="0"/>
+          </a:p>
+          <a:p>
+            <a:r>
+              <a:rPr lang="ja-JP" altLang="en-US" dirty="0" smtClean="0"/>
+              <a:t>興味が湧いてきたら</a:t>
+            </a:r>
+            <a:r>
+              <a:rPr lang="en-US" altLang="ja-JP" dirty="0" smtClean="0"/>
+              <a:t>Lightning Talk</a:t>
+            </a:r>
+            <a:r>
+              <a:rPr lang="ja-JP" altLang="en-US" dirty="0" smtClean="0"/>
+              <a:t>にチャレンジしてみる</a:t>
+            </a:r>
+            <a:endParaRPr lang="en-US" altLang="ja-JP" dirty="0" smtClean="0"/>
+          </a:p>
+          <a:p>
+            <a:r>
+              <a:rPr lang="ja-JP" altLang="en-US" dirty="0" smtClean="0"/>
+              <a:t>やさしいマサカリを受ける</a:t>
+            </a:r>
+            <a:endParaRPr lang="en-US" altLang="ja-JP" dirty="0" smtClean="0"/>
+          </a:p>
+          <a:p>
+            <a:r>
+              <a:rPr lang="ja-JP" altLang="en-US" dirty="0" smtClean="0"/>
+              <a:t>人前でプレゼンする練習にもなる</a:t>
+            </a:r>
+            <a:endParaRPr lang="en-US" altLang="ja-JP" dirty="0" smtClean="0"/>
+          </a:p>
+        </p:txBody>
+      </p:sp>
+    </p:spTree>
+    <p:extLst>
+      <p:ext uri="{BB962C8B-B14F-4D97-AF65-F5344CB8AC3E}">
+        <p14:creationId xmlns:p14="http://schemas.microsoft.com/office/powerpoint/2010/main" val="278866242"/>
+      </p:ext>
+    </p:extLst>
+  </p:cSld>
+  <p:clrMapOvr>
+    <a:masterClrMapping/>
+  </p:clrMapOvr>
+</p:sld>
+</file>
+
+<file path=ppt/slides/slide11.xml><?xml version="1.0" encoding="utf-8"?>
+<p:sld xmlns:a="http://schemas.openxmlformats.org/drawingml/2006/main" xmlns:r="http://schemas.openxmlformats.org/officeDocument/2006/relationships" xmlns:p="http://schemas.openxmlformats.org/presentationml/2006/main">
+  <p:cSld>
+    <p:spTree>
+      <p:nvGrpSpPr>
+        <p:cNvPr id="1" name=""/>
+        <p:cNvGrpSpPr/>
+        <p:nvPr/>
+      </p:nvGrpSpPr>
+      <p:grpSpPr>
+        <a:xfrm>
+          <a:off x="0" y="0"/>
+          <a:ext cx="0" cy="0"/>
+          <a:chOff x="0" y="0"/>
+          <a:chExt cx="0" cy="0"/>
+        </a:xfrm>
+      </p:grpSpPr>
+      <p:sp>
+        <p:nvSpPr>
+          <p:cNvPr id="2" name="タイトル 1"/>
+          <p:cNvSpPr>
+            <a:spLocks noGrp="1"/>
+          </p:cNvSpPr>
+          <p:nvPr>
+            <p:ph type="title"/>
+          </p:nvPr>
+        </p:nvSpPr>
+        <p:spPr/>
+        <p:txBody>
+          <a:bodyPr/>
+          <a:lstStyle/>
+          <a:p>
+            <a:r>
               <a:rPr lang="ja-JP" altLang="en-US" dirty="0" smtClean="0"/>
               <a:t>営業と技術がいがみ合わない世界</a:t>
             </a:r>
@@ -3431,7 +3593,7 @@
 </p:sld>
 </file>
 
-<file path=ppt/slides/slide11.xml><?xml version="1.0" encoding="utf-8"?>
+<file path=ppt/slides/slide12.xml><?xml version="1.0" encoding="utf-8"?>
 <p:sld xmlns:a="http://schemas.openxmlformats.org/drawingml/2006/main" xmlns:r="http://schemas.openxmlformats.org/officeDocument/2006/relationships" xmlns:p="http://schemas.openxmlformats.org/presentationml/2006/main">
   <p:cSld>
     <p:spTree>
@@ -3678,11 +3840,7 @@
           <a:p>
             <a:r>
               <a:rPr lang="en-US" altLang="ja-JP" dirty="0" smtClean="0"/>
-              <a:t>Japan Xamarin User </a:t>
-            </a:r>
-            <a:r>
-              <a:rPr lang="en-US" altLang="ja-JP" dirty="0" smtClean="0"/>
-              <a:t>Group</a:t>
+              <a:t>Japan Xamarin User Group</a:t>
             </a:r>
             <a:r>
               <a:rPr lang="ja-JP" altLang="en-US" dirty="0" smtClean="0"/>
@@ -4261,11 +4419,7 @@
           <a:p>
             <a:r>
               <a:rPr kumimoji="1" lang="ja-JP" altLang="en-US" dirty="0" smtClean="0"/>
-              <a:t>開発言語</a:t>
-            </a:r>
-            <a:r>
-              <a:rPr kumimoji="1" lang="ja-JP" altLang="en-US" dirty="0" smtClean="0"/>
-              <a:t>を学ぶのは難しいけど楽しい</a:t>
+              <a:t>開発言語を学ぶのは難しいけど楽しい</a:t>
             </a:r>
             <a:endParaRPr kumimoji="1" lang="en-US" altLang="ja-JP" dirty="0" smtClean="0"/>
           </a:p>
@@ -4510,15 +4664,7 @@
           <a:p>
             <a:r>
               <a:rPr lang="ja-JP" altLang="en-US" dirty="0" smtClean="0"/>
-              <a:t>勉強会</a:t>
-            </a:r>
-            <a:r>
-              <a:rPr lang="ja-JP" altLang="en-US" dirty="0" smtClean="0"/>
-              <a:t>に来るのは技術が好きな</a:t>
-            </a:r>
-            <a:r>
-              <a:rPr lang="ja-JP" altLang="en-US" dirty="0" smtClean="0"/>
-              <a:t>人でかつコミュニケーションが好きな人</a:t>
+              <a:t>勉強会に来るのは技術が好きな人でかつコミュニケーションが好きな人</a:t>
             </a:r>
             <a:endParaRPr lang="en-US" altLang="ja-JP" dirty="0" smtClean="0"/>
           </a:p>
@@ -4532,11 +4678,7 @@
           <a:p>
             <a:r>
               <a:rPr kumimoji="1" lang="ja-JP" altLang="en-US" dirty="0" smtClean="0"/>
-              <a:t>コミュニティは怖く</a:t>
-            </a:r>
-            <a:r>
-              <a:rPr kumimoji="1" lang="ja-JP" altLang="en-US" dirty="0" smtClean="0"/>
-              <a:t>ない</a:t>
+              <a:t>コミュニティは怖くない</a:t>
             </a:r>
             <a:endParaRPr kumimoji="1" lang="en-US" altLang="ja-JP" dirty="0" smtClean="0"/>
           </a:p>

</xml_diff>